<commit_message>
updated classifiers in presentation
</commit_message>
<xml_diff>
--- a/documentation/presentazione/presentazione.pptx
+++ b/documentation/presentazione/presentazione.pptx
@@ -120,6 +120,11 @@
       </a:defRPr>
     </a:lvl9pPr>
   </p:defaultTextStyle>
+  <p:extLst>
+    <p:ext uri="{EFAFB233-063F-42B5-8137-9DF3F51BA10A}">
+      <p15:sldGuideLst xmlns:p15="http://schemas.microsoft.com/office/powerpoint/2012/main"/>
+    </p:ext>
+  </p:extLst>
 </p:presentation>
 </file>
 
@@ -281,7 +286,7 @@
                 </a:solidFill>
               </a:rPr>
               <a:pPr defTabSz="829178"/>
-              <a:t>2/22/2020</a:t>
+              <a:t>2/24/2020</a:t>
             </a:fld>
             <a:endParaRPr lang="en-US" sz="1632">
               <a:solidFill>
@@ -441,7 +446,7 @@
                 </a:solidFill>
               </a:rPr>
               <a:pPr defTabSz="829178"/>
-              <a:t>2/22/2020</a:t>
+              <a:t>2/24/2020</a:t>
             </a:fld>
             <a:endParaRPr lang="en-US" sz="1632">
               <a:solidFill>
@@ -671,7 +676,7 @@
                 </a:solidFill>
               </a:rPr>
               <a:pPr defTabSz="829178"/>
-              <a:t>2/22/2020</a:t>
+              <a:t>2/24/2020</a:t>
             </a:fld>
             <a:endParaRPr lang="en-US" sz="1632">
               <a:solidFill>
@@ -892,7 +897,7 @@
                 </a:solidFill>
               </a:rPr>
               <a:pPr defTabSz="829178"/>
-              <a:t>2/22/2020</a:t>
+              <a:t>2/24/2020</a:t>
             </a:fld>
             <a:endParaRPr lang="en-US" sz="1632">
               <a:solidFill>
@@ -1152,7 +1157,7 @@
                 </a:solidFill>
               </a:rPr>
               <a:pPr defTabSz="829178"/>
-              <a:t>2/22/2020</a:t>
+              <a:t>2/24/2020</a:t>
             </a:fld>
             <a:endParaRPr lang="en-US" sz="1632">
               <a:solidFill>
@@ -1346,7 +1351,7 @@
                 </a:solidFill>
               </a:rPr>
               <a:pPr defTabSz="829178"/>
-              <a:t>2/22/2020</a:t>
+              <a:t>2/24/2020</a:t>
             </a:fld>
             <a:endParaRPr lang="en-US" sz="1632">
               <a:solidFill>
@@ -1506,7 +1511,7 @@
                 </a:solidFill>
               </a:rPr>
               <a:pPr defTabSz="829178"/>
-              <a:t>2/22/2020</a:t>
+              <a:t>2/24/2020</a:t>
             </a:fld>
             <a:endParaRPr lang="en-US" sz="1632">
               <a:solidFill>
@@ -1730,7 +1735,7 @@
                 </a:solidFill>
               </a:rPr>
               <a:pPr defTabSz="829178"/>
-              <a:t>2/22/2020</a:t>
+              <a:t>2/24/2020</a:t>
             </a:fld>
             <a:endParaRPr lang="en-US" sz="1632">
               <a:solidFill>
@@ -1993,7 +1998,7 @@
                 </a:solidFill>
               </a:rPr>
               <a:pPr defTabSz="829178"/>
-              <a:t>2/22/2020</a:t>
+              <a:t>2/24/2020</a:t>
             </a:fld>
             <a:endParaRPr lang="en-US" sz="1632">
               <a:solidFill>
@@ -2190,7 +2195,7 @@
                 </a:solidFill>
               </a:rPr>
               <a:pPr defTabSz="829178"/>
-              <a:t>2/22/2020</a:t>
+              <a:t>2/24/2020</a:t>
             </a:fld>
             <a:endParaRPr lang="en-US" sz="1632">
               <a:solidFill>
@@ -2350,7 +2355,7 @@
                 </a:solidFill>
               </a:rPr>
               <a:pPr defTabSz="829178"/>
-              <a:t>2/22/2020</a:t>
+              <a:t>2/24/2020</a:t>
             </a:fld>
             <a:endParaRPr lang="en-US" sz="1632">
               <a:solidFill>
@@ -2580,7 +2585,7 @@
                 </a:solidFill>
               </a:rPr>
               <a:pPr defTabSz="829178"/>
-              <a:t>2/22/2020</a:t>
+              <a:t>2/24/2020</a:t>
             </a:fld>
             <a:endParaRPr lang="en-US" sz="1632">
               <a:solidFill>
@@ -2801,7 +2806,7 @@
                 </a:solidFill>
               </a:rPr>
               <a:pPr defTabSz="829178"/>
-              <a:t>2/22/2020</a:t>
+              <a:t>2/24/2020</a:t>
             </a:fld>
             <a:endParaRPr lang="en-US" sz="1632">
               <a:solidFill>
@@ -3061,7 +3066,7 @@
                 </a:solidFill>
               </a:rPr>
               <a:pPr defTabSz="829178"/>
-              <a:t>2/22/2020</a:t>
+              <a:t>2/24/2020</a:t>
             </a:fld>
             <a:endParaRPr lang="en-US" sz="1632">
               <a:solidFill>
@@ -3255,7 +3260,7 @@
                 </a:solidFill>
               </a:rPr>
               <a:pPr defTabSz="829178"/>
-              <a:t>2/22/2020</a:t>
+              <a:t>2/24/2020</a:t>
             </a:fld>
             <a:endParaRPr lang="en-US" sz="1632">
               <a:solidFill>
@@ -3712,7 +3717,7 @@
                 </a:solidFill>
               </a:rPr>
               <a:pPr defTabSz="829178"/>
-              <a:t>2/22/2020</a:t>
+              <a:t>2/24/2020</a:t>
             </a:fld>
             <a:endParaRPr lang="en-US" sz="1632">
               <a:solidFill>
@@ -4364,7 +4369,7 @@
                 </a:solidFill>
               </a:rPr>
               <a:pPr defTabSz="829178"/>
-              <a:t>2/22/2020</a:t>
+              <a:t>2/24/2020</a:t>
             </a:fld>
             <a:endParaRPr lang="en-US" sz="1632">
               <a:solidFill>
@@ -5016,7 +5021,7 @@
                 </a:solidFill>
               </a:rPr>
               <a:pPr defTabSz="829178"/>
-              <a:t>2/22/2020</a:t>
+              <a:t>2/24/2020</a:t>
             </a:fld>
             <a:endParaRPr lang="en-US" sz="1632">
               <a:solidFill>
@@ -5486,7 +5491,6 @@
               <a:rPr spc="-181" dirty="0"/>
               <a:t>project</a:t>
             </a:r>
-            <a:endParaRPr spc="-181" dirty="0"/>
           </a:p>
         </p:txBody>
       </p:sp>
@@ -5788,7 +5792,7 @@
         <p:spPr>
           <a:xfrm>
             <a:off x="1237129" y="2294965"/>
-            <a:ext cx="793807" cy="369332"/>
+            <a:ext cx="934871" cy="369332"/>
           </a:xfrm>
           <a:prstGeom prst="rect">
             <a:avLst/>
@@ -5833,8 +5837,22 @@
                 <a:ea typeface="+mn-ea"/>
                 <a:cs typeface="Arial" panose="020B0604020202020204" pitchFamily="34" charset="0"/>
               </a:rPr>
-              <a:t>NB</a:t>
-            </a:r>
+              <a:t>3NN</a:t>
+            </a:r>
+            <a:endParaRPr kumimoji="0" lang="en-US" sz="1800" b="0" i="0" u="none" strike="noStrike" kern="1200" cap="none" spc="0" normalizeH="0" baseline="0" noProof="0" dirty="0" smtClean="0">
+              <a:ln>
+                <a:noFill/>
+              </a:ln>
+              <a:solidFill>
+                <a:prstClr val="black"/>
+              </a:solidFill>
+              <a:effectLst/>
+              <a:uLnTx/>
+              <a:uFillTx/>
+              <a:latin typeface="Arial" panose="020B0604020202020204" pitchFamily="34" charset="0"/>
+              <a:ea typeface="+mn-ea"/>
+              <a:cs typeface="Arial" panose="020B0604020202020204" pitchFamily="34" charset="0"/>
+            </a:endParaRPr>
           </a:p>
         </p:txBody>
       </p:sp>
@@ -5847,7 +5865,7 @@
         <p:spPr>
           <a:xfrm>
             <a:off x="1326776" y="4392705"/>
-            <a:ext cx="2024913" cy="369332"/>
+            <a:ext cx="793807" cy="369332"/>
           </a:xfrm>
           <a:prstGeom prst="rect">
             <a:avLst/>
@@ -5892,14 +5910,28 @@
                 <a:ea typeface="+mn-ea"/>
                 <a:cs typeface="Arial" panose="020B0604020202020204" pitchFamily="34" charset="0"/>
               </a:rPr>
-              <a:t>NB Multinomial</a:t>
-            </a:r>
+              <a:t>NB</a:t>
+            </a:r>
+            <a:endParaRPr kumimoji="0" lang="en-US" sz="1800" b="0" i="0" u="none" strike="noStrike" kern="1200" cap="none" spc="0" normalizeH="0" baseline="0" noProof="0" dirty="0" smtClean="0">
+              <a:ln>
+                <a:noFill/>
+              </a:ln>
+              <a:solidFill>
+                <a:prstClr val="black"/>
+              </a:solidFill>
+              <a:effectLst/>
+              <a:uLnTx/>
+              <a:uFillTx/>
+              <a:latin typeface="Arial" panose="020B0604020202020204" pitchFamily="34" charset="0"/>
+              <a:ea typeface="+mn-ea"/>
+              <a:cs typeface="Arial" panose="020B0604020202020204" pitchFamily="34" charset="0"/>
+            </a:endParaRPr>
           </a:p>
         </p:txBody>
       </p:sp>
       <p:pic>
         <p:nvPicPr>
-          <p:cNvPr id="6" name="Immagine 5"/>
+          <p:cNvPr id="3" name="Immagine 2"/>
           <p:cNvPicPr>
             <a:picLocks noChangeAspect="1"/>
           </p:cNvPicPr>
@@ -5919,8 +5951,8 @@
         </p:blipFill>
         <p:spPr>
           <a:xfrm>
-            <a:off x="3482602" y="2230964"/>
-            <a:ext cx="4616450" cy="1549400"/>
+            <a:off x="3482602" y="2189070"/>
+            <a:ext cx="4581525" cy="400050"/>
           </a:xfrm>
           <a:prstGeom prst="rect">
             <a:avLst/>
@@ -5929,7 +5961,7 @@
       </p:pic>
       <p:pic>
         <p:nvPicPr>
-          <p:cNvPr id="8" name="Immagine 7"/>
+          <p:cNvPr id="4" name="Immagine 3"/>
           <p:cNvPicPr>
             <a:picLocks noChangeAspect="1"/>
           </p:cNvPicPr>
@@ -5949,8 +5981,68 @@
         </p:blipFill>
         <p:spPr>
           <a:xfrm>
-            <a:off x="3482602" y="4038137"/>
-            <a:ext cx="4724400" cy="1454150"/>
+            <a:off x="3482602" y="2589120"/>
+            <a:ext cx="7524750" cy="1143000"/>
+          </a:xfrm>
+          <a:prstGeom prst="rect">
+            <a:avLst/>
+          </a:prstGeom>
+        </p:spPr>
+      </p:pic>
+      <p:pic>
+        <p:nvPicPr>
+          <p:cNvPr id="9" name="Immagine 8"/>
+          <p:cNvPicPr>
+            <a:picLocks noChangeAspect="1"/>
+          </p:cNvPicPr>
+          <p:nvPr/>
+        </p:nvPicPr>
+        <p:blipFill>
+          <a:blip r:embed="rId4">
+            <a:extLst>
+              <a:ext uri="{28A0092B-C50C-407E-A947-70E740481C1C}">
+                <a14:useLocalDpi xmlns:a14="http://schemas.microsoft.com/office/drawing/2010/main" val="0"/>
+              </a:ext>
+            </a:extLst>
+          </a:blip>
+          <a:stretch>
+            <a:fillRect/>
+          </a:stretch>
+        </p:blipFill>
+        <p:spPr>
+          <a:xfrm>
+            <a:off x="3482602" y="3887880"/>
+            <a:ext cx="4695825" cy="504825"/>
+          </a:xfrm>
+          <a:prstGeom prst="rect">
+            <a:avLst/>
+          </a:prstGeom>
+        </p:spPr>
+      </p:pic>
+      <p:pic>
+        <p:nvPicPr>
+          <p:cNvPr id="10" name="Immagine 9"/>
+          <p:cNvPicPr>
+            <a:picLocks noChangeAspect="1"/>
+          </p:cNvPicPr>
+          <p:nvPr/>
+        </p:nvPicPr>
+        <p:blipFill>
+          <a:blip r:embed="rId5">
+            <a:extLst>
+              <a:ext uri="{28A0092B-C50C-407E-A947-70E740481C1C}">
+                <a14:useLocalDpi xmlns:a14="http://schemas.microsoft.com/office/drawing/2010/main" val="0"/>
+              </a:ext>
+            </a:extLst>
+          </a:blip>
+          <a:stretch>
+            <a:fillRect/>
+          </a:stretch>
+        </p:blipFill>
+        <p:spPr>
+          <a:xfrm>
+            <a:off x="3482602" y="4454337"/>
+            <a:ext cx="7677150" cy="952500"/>
           </a:xfrm>
           <a:prstGeom prst="rect">
             <a:avLst/>
@@ -6164,7 +6256,7 @@
           <p:nvPr>
             <p:extLst>
               <p:ext uri="{D42A27DB-BD31-4B8C-83A1-F6EECF244321}">
-                <p14:modId xmlns:p14="http://schemas.microsoft.com/office/powerpoint/2010/main" val="1966390398"/>
+                <p14:modId xmlns:p14="http://schemas.microsoft.com/office/powerpoint/2010/main" val="392802943"/>
               </p:ext>
             </p:extLst>
           </p:nvPr>
@@ -6252,7 +6344,7 @@
                     <a:p>
                       <a:r>
                         <a:rPr lang="en-US" dirty="0" smtClean="0"/>
-                        <a:t>96.22%</a:t>
+                        <a:t>90.62%</a:t>
                       </a:r>
                       <a:endParaRPr lang="en-US" dirty="0"/>
                     </a:p>
@@ -6287,7 +6379,7 @@
                     <a:p>
                       <a:r>
                         <a:rPr lang="en-US" dirty="0" smtClean="0"/>
-                        <a:t>88.98%</a:t>
+                        <a:t>88.16%</a:t>
                       </a:r>
                       <a:endParaRPr lang="en-US" dirty="0"/>
                     </a:p>
@@ -6322,7 +6414,7 @@
                     <a:p>
                       <a:r>
                         <a:rPr lang="en-US" dirty="0" smtClean="0"/>
-                        <a:t>88.16%</a:t>
+                        <a:t>89.97%</a:t>
                       </a:r>
                       <a:endParaRPr lang="en-US" dirty="0"/>
                     </a:p>
@@ -6343,7 +6435,7 @@
                     <a:p>
                       <a:r>
                         <a:rPr lang="en-US" dirty="0" smtClean="0"/>
-                        <a:t>3NN</a:t>
+                        <a:t>2NN</a:t>
                       </a:r>
                       <a:endParaRPr lang="en-US" dirty="0"/>
                     </a:p>
@@ -6357,7 +6449,11 @@
                     <a:p>
                       <a:r>
                         <a:rPr lang="en-US" dirty="0" smtClean="0"/>
-                        <a:t>83.06%</a:t>
+                        <a:t>88.16</a:t>
+                      </a:r>
+                      <a:r>
+                        <a:rPr lang="en-US" dirty="0" smtClean="0"/>
+                        <a:t>%</a:t>
                       </a:r>
                       <a:endParaRPr lang="en-US" dirty="0"/>
                     </a:p>
@@ -6378,8 +6474,9 @@
                     <a:p>
                       <a:r>
                         <a:rPr lang="en-US" dirty="0" smtClean="0"/>
-                        <a:t>NB</a:t>
+                        <a:t>3NN</a:t>
                       </a:r>
+                      <a:endParaRPr lang="en-US" dirty="0" smtClean="0"/>
                     </a:p>
                   </a:txBody>
                   <a:tcPr/>
@@ -6391,7 +6488,7 @@
                     <a:p>
                       <a:r>
                         <a:rPr lang="en-US" dirty="0" smtClean="0"/>
-                        <a:t>87.33%</a:t>
+                        <a:t>85.70%</a:t>
                       </a:r>
                       <a:endParaRPr lang="en-US" dirty="0"/>
                     </a:p>
@@ -6412,8 +6509,9 @@
                     <a:p>
                       <a:r>
                         <a:rPr lang="en-US" dirty="0" smtClean="0"/>
-                        <a:t>NB Multinomial</a:t>
+                        <a:t>NB</a:t>
                       </a:r>
+                      <a:endParaRPr lang="en-US" dirty="0" smtClean="0"/>
                     </a:p>
                   </a:txBody>
                   <a:tcPr/>
@@ -6424,8 +6522,8 @@
                     <a:lstStyle/>
                     <a:p>
                       <a:r>
-                        <a:rPr lang="en-US" dirty="0" smtClean="0"/>
-                        <a:t>90.13%</a:t>
+                        <a:rPr lang="en-US" smtClean="0"/>
+                        <a:t>84.05%</a:t>
                       </a:r>
                       <a:endParaRPr lang="en-US" dirty="0"/>
                     </a:p>
@@ -6525,7 +6623,7 @@
         </p:nvSpPr>
         <p:spPr>
           <a:xfrm>
-            <a:off x="1102657" y="2330823"/>
+            <a:off x="1174375" y="2245098"/>
             <a:ext cx="9956636" cy="646331"/>
           </a:xfrm>
           <a:prstGeom prst="rect">
@@ -6604,7 +6702,7 @@
       </p:sp>
       <p:pic>
         <p:nvPicPr>
-          <p:cNvPr id="5" name="Immagine 4"/>
+          <p:cNvPr id="3" name="Immagine 2"/>
           <p:cNvPicPr>
             <a:picLocks noChangeAspect="1"/>
           </p:cNvPicPr>
@@ -6624,8 +6722,8 @@
         </p:blipFill>
         <p:spPr>
           <a:xfrm>
-            <a:off x="1174375" y="3532916"/>
-            <a:ext cx="3045182" cy="1410539"/>
+            <a:off x="1350147" y="3415553"/>
+            <a:ext cx="2477223" cy="993121"/>
           </a:xfrm>
           <a:prstGeom prst="rect">
             <a:avLst/>
@@ -6634,7 +6732,7 @@
       </p:pic>
       <p:pic>
         <p:nvPicPr>
-          <p:cNvPr id="6" name="Immagine 5"/>
+          <p:cNvPr id="7" name="Immagine 6"/>
           <p:cNvPicPr>
             <a:picLocks noChangeAspect="1"/>
           </p:cNvPicPr>
@@ -6654,8 +6752,38 @@
         </p:blipFill>
         <p:spPr>
           <a:xfrm>
-            <a:off x="4219557" y="3651177"/>
-            <a:ext cx="7335651" cy="923886"/>
+            <a:off x="4221536" y="3163336"/>
+            <a:ext cx="4448175" cy="342900"/>
+          </a:xfrm>
+          <a:prstGeom prst="rect">
+            <a:avLst/>
+          </a:prstGeom>
+        </p:spPr>
+      </p:pic>
+      <p:pic>
+        <p:nvPicPr>
+          <p:cNvPr id="8" name="Immagine 7"/>
+          <p:cNvPicPr>
+            <a:picLocks noChangeAspect="1"/>
+          </p:cNvPicPr>
+          <p:nvPr/>
+        </p:nvPicPr>
+        <p:blipFill>
+          <a:blip r:embed="rId4">
+            <a:extLst>
+              <a:ext uri="{28A0092B-C50C-407E-A947-70E740481C1C}">
+                <a14:useLocalDpi xmlns:a14="http://schemas.microsoft.com/office/drawing/2010/main" val="0"/>
+              </a:ext>
+            </a:extLst>
+          </a:blip>
+          <a:stretch>
+            <a:fillRect/>
+          </a:stretch>
+        </p:blipFill>
+        <p:spPr>
+          <a:xfrm>
+            <a:off x="4221536" y="3683369"/>
+            <a:ext cx="7248525" cy="1047750"/>
           </a:xfrm>
           <a:prstGeom prst="rect">
             <a:avLst/>
@@ -7918,10 +8046,6 @@
               </a:rPr>
               <a:t>and 2016-06-01.</a:t>
             </a:r>
-            <a:endParaRPr lang="en-US" dirty="0">
-              <a:latin typeface="Arial" panose="020B0604020202020204" pitchFamily="34" charset="0"/>
-              <a:cs typeface="Arial" panose="020B0604020202020204" pitchFamily="34" charset="0"/>
-            </a:endParaRPr>
           </a:p>
         </p:txBody>
       </p:sp>
@@ -9037,9 +9161,49 @@
           </a:p>
         </p:txBody>
       </p:sp>
+      <p:sp>
+        <p:nvSpPr>
+          <p:cNvPr id="7" name="CasellaDiTesto 6"/>
+          <p:cNvSpPr txBox="1"/>
+          <p:nvPr/>
+        </p:nvSpPr>
+        <p:spPr>
+          <a:xfrm>
+            <a:off x="1335741" y="4392706"/>
+            <a:ext cx="845103" cy="369332"/>
+          </a:xfrm>
+          <a:prstGeom prst="rect">
+            <a:avLst/>
+          </a:prstGeom>
+          <a:noFill/>
+        </p:spPr>
+        <p:txBody>
+          <a:bodyPr wrap="none" rtlCol="0">
+            <a:spAutoFit/>
+          </a:bodyPr>
+          <a:lstStyle/>
+          <a:p>
+            <a:pPr marL="285750" indent="-285750">
+              <a:buFont typeface="Arial" panose="020B0604020202020204" pitchFamily="34" charset="0"/>
+              <a:buChar char="•"/>
+            </a:pPr>
+            <a:r>
+              <a:rPr lang="en-US" dirty="0" smtClean="0">
+                <a:latin typeface="Arial" panose="020B0604020202020204" pitchFamily="34" charset="0"/>
+                <a:cs typeface="Arial" panose="020B0604020202020204" pitchFamily="34" charset="0"/>
+              </a:rPr>
+              <a:t>J48</a:t>
+            </a:r>
+            <a:endParaRPr lang="en-US" dirty="0">
+              <a:latin typeface="Arial" panose="020B0604020202020204" pitchFamily="34" charset="0"/>
+              <a:cs typeface="Arial" panose="020B0604020202020204" pitchFamily="34" charset="0"/>
+            </a:endParaRPr>
+          </a:p>
+        </p:txBody>
+      </p:sp>
       <p:pic>
         <p:nvPicPr>
-          <p:cNvPr id="6" name="Immagine 5"/>
+          <p:cNvPr id="3" name="Immagine 2"/>
           <p:cNvPicPr>
             <a:picLocks noChangeAspect="1"/>
           </p:cNvPicPr>
@@ -9059,57 +9223,17 @@
         </p:blipFill>
         <p:spPr>
           <a:xfrm>
-            <a:off x="3584202" y="2151530"/>
-            <a:ext cx="4629150" cy="1428750"/>
+            <a:off x="2912223" y="2174831"/>
+            <a:ext cx="4448175" cy="342900"/>
           </a:xfrm>
           <a:prstGeom prst="rect">
             <a:avLst/>
           </a:prstGeom>
         </p:spPr>
       </p:pic>
-      <p:sp>
-        <p:nvSpPr>
-          <p:cNvPr id="7" name="CasellaDiTesto 6"/>
-          <p:cNvSpPr txBox="1"/>
-          <p:nvPr/>
-        </p:nvSpPr>
-        <p:spPr>
-          <a:xfrm>
-            <a:off x="1335741" y="4392706"/>
-            <a:ext cx="845103" cy="369332"/>
-          </a:xfrm>
-          <a:prstGeom prst="rect">
-            <a:avLst/>
-          </a:prstGeom>
-          <a:noFill/>
-        </p:spPr>
-        <p:txBody>
-          <a:bodyPr wrap="none" rtlCol="0">
-            <a:spAutoFit/>
-          </a:bodyPr>
-          <a:lstStyle/>
-          <a:p>
-            <a:pPr marL="285750" indent="-285750">
-              <a:buFont typeface="Arial" panose="020B0604020202020204" pitchFamily="34" charset="0"/>
-              <a:buChar char="•"/>
-            </a:pPr>
-            <a:r>
-              <a:rPr lang="en-US" dirty="0" smtClean="0">
-                <a:latin typeface="Arial" panose="020B0604020202020204" pitchFamily="34" charset="0"/>
-                <a:cs typeface="Arial" panose="020B0604020202020204" pitchFamily="34" charset="0"/>
-              </a:rPr>
-              <a:t>J48</a:t>
-            </a:r>
-            <a:endParaRPr lang="en-US" dirty="0">
-              <a:latin typeface="Arial" panose="020B0604020202020204" pitchFamily="34" charset="0"/>
-              <a:cs typeface="Arial" panose="020B0604020202020204" pitchFamily="34" charset="0"/>
-            </a:endParaRPr>
-          </a:p>
-        </p:txBody>
-      </p:sp>
       <p:pic>
         <p:nvPicPr>
-          <p:cNvPr id="8" name="Immagine 7"/>
+          <p:cNvPr id="4" name="Immagine 3"/>
           <p:cNvPicPr>
             <a:picLocks noChangeAspect="1"/>
           </p:cNvPicPr>
@@ -9129,8 +9253,68 @@
         </p:blipFill>
         <p:spPr>
           <a:xfrm>
-            <a:off x="3539752" y="4034963"/>
-            <a:ext cx="4673600" cy="1454150"/>
+            <a:off x="2912223" y="2577803"/>
+            <a:ext cx="7248525" cy="1047750"/>
+          </a:xfrm>
+          <a:prstGeom prst="rect">
+            <a:avLst/>
+          </a:prstGeom>
+        </p:spPr>
+      </p:pic>
+      <p:pic>
+        <p:nvPicPr>
+          <p:cNvPr id="9" name="Immagine 8"/>
+          <p:cNvPicPr>
+            <a:picLocks noChangeAspect="1"/>
+          </p:cNvPicPr>
+          <p:nvPr/>
+        </p:nvPicPr>
+        <p:blipFill>
+          <a:blip r:embed="rId4">
+            <a:extLst>
+              <a:ext uri="{28A0092B-C50C-407E-A947-70E740481C1C}">
+                <a14:useLocalDpi xmlns:a14="http://schemas.microsoft.com/office/drawing/2010/main" val="0"/>
+              </a:ext>
+            </a:extLst>
+          </a:blip>
+          <a:stretch>
+            <a:fillRect/>
+          </a:stretch>
+        </p:blipFill>
+        <p:spPr>
+          <a:xfrm>
+            <a:off x="2912223" y="3910293"/>
+            <a:ext cx="5286375" cy="428625"/>
+          </a:xfrm>
+          <a:prstGeom prst="rect">
+            <a:avLst/>
+          </a:prstGeom>
+        </p:spPr>
+      </p:pic>
+      <p:pic>
+        <p:nvPicPr>
+          <p:cNvPr id="10" name="Immagine 9"/>
+          <p:cNvPicPr>
+            <a:picLocks noChangeAspect="1"/>
+          </p:cNvPicPr>
+          <p:nvPr/>
+        </p:nvPicPr>
+        <p:blipFill>
+          <a:blip r:embed="rId5">
+            <a:extLst>
+              <a:ext uri="{28A0092B-C50C-407E-A947-70E740481C1C}">
+                <a14:useLocalDpi xmlns:a14="http://schemas.microsoft.com/office/drawing/2010/main" val="0"/>
+              </a:ext>
+            </a:extLst>
+          </a:blip>
+          <a:stretch>
+            <a:fillRect/>
+          </a:stretch>
+        </p:blipFill>
+        <p:spPr>
+          <a:xfrm>
+            <a:off x="2912223" y="4300483"/>
+            <a:ext cx="8410575" cy="1247775"/>
           </a:xfrm>
           <a:prstGeom prst="rect">
             <a:avLst/>
@@ -9311,6 +9495,16 @@
               <a:defRPr/>
             </a:pPr>
             <a:r>
+              <a:rPr lang="en-US" dirty="0">
+                <a:solidFill>
+                  <a:prstClr val="black"/>
+                </a:solidFill>
+                <a:latin typeface="Arial" panose="020B0604020202020204" pitchFamily="34" charset="0"/>
+                <a:cs typeface="Arial" panose="020B0604020202020204" pitchFamily="34" charset="0"/>
+              </a:rPr>
+              <a:t>2</a:t>
+            </a:r>
+            <a:r>
               <a:rPr kumimoji="0" lang="en-US" sz="1800" b="0" i="0" u="none" strike="noStrike" kern="1200" cap="none" spc="0" normalizeH="0" baseline="0" noProof="0" dirty="0" smtClean="0">
                 <a:ln>
                   <a:noFill/>
@@ -9325,14 +9519,28 @@
                 <a:ea typeface="+mn-ea"/>
                 <a:cs typeface="Arial" panose="020B0604020202020204" pitchFamily="34" charset="0"/>
               </a:rPr>
-              <a:t>3NN</a:t>
-            </a:r>
+              <a:t>NN</a:t>
+            </a:r>
+            <a:endParaRPr kumimoji="0" lang="en-US" sz="1800" b="0" i="0" u="none" strike="noStrike" kern="1200" cap="none" spc="0" normalizeH="0" baseline="0" noProof="0" dirty="0" smtClean="0">
+              <a:ln>
+                <a:noFill/>
+              </a:ln>
+              <a:solidFill>
+                <a:prstClr val="black"/>
+              </a:solidFill>
+              <a:effectLst/>
+              <a:uLnTx/>
+              <a:uFillTx/>
+              <a:latin typeface="Arial" panose="020B0604020202020204" pitchFamily="34" charset="0"/>
+              <a:ea typeface="+mn-ea"/>
+              <a:cs typeface="Arial" panose="020B0604020202020204" pitchFamily="34" charset="0"/>
+            </a:endParaRPr>
           </a:p>
         </p:txBody>
       </p:sp>
       <p:pic>
         <p:nvPicPr>
-          <p:cNvPr id="3" name="Immagine 2"/>
+          <p:cNvPr id="6" name="Immagine 5"/>
           <p:cNvPicPr>
             <a:picLocks noChangeAspect="1"/>
           </p:cNvPicPr>
@@ -9352,8 +9560,8 @@
         </p:blipFill>
         <p:spPr>
           <a:xfrm>
-            <a:off x="3539752" y="2145553"/>
-            <a:ext cx="4629150" cy="1473200"/>
+            <a:off x="3468220" y="2189630"/>
+            <a:ext cx="4914900" cy="381000"/>
           </a:xfrm>
           <a:prstGeom prst="rect">
             <a:avLst/>
@@ -9362,7 +9570,7 @@
       </p:pic>
       <p:pic>
         <p:nvPicPr>
-          <p:cNvPr id="4" name="Immagine 3"/>
+          <p:cNvPr id="8" name="Immagine 7"/>
           <p:cNvPicPr>
             <a:picLocks noChangeAspect="1"/>
           </p:cNvPicPr>
@@ -9382,8 +9590,68 @@
         </p:blipFill>
         <p:spPr>
           <a:xfrm>
-            <a:off x="3539752" y="4038138"/>
-            <a:ext cx="4559300" cy="1447800"/>
+            <a:off x="3468220" y="2570630"/>
+            <a:ext cx="7905750" cy="1095375"/>
+          </a:xfrm>
+          <a:prstGeom prst="rect">
+            <a:avLst/>
+          </a:prstGeom>
+        </p:spPr>
+      </p:pic>
+      <p:pic>
+        <p:nvPicPr>
+          <p:cNvPr id="9" name="Immagine 8"/>
+          <p:cNvPicPr>
+            <a:picLocks noChangeAspect="1"/>
+          </p:cNvPicPr>
+          <p:nvPr/>
+        </p:nvPicPr>
+        <p:blipFill>
+          <a:blip r:embed="rId4">
+            <a:extLst>
+              <a:ext uri="{28A0092B-C50C-407E-A947-70E740481C1C}">
+                <a14:useLocalDpi xmlns:a14="http://schemas.microsoft.com/office/drawing/2010/main" val="0"/>
+              </a:ext>
+            </a:extLst>
+          </a:blip>
+          <a:stretch>
+            <a:fillRect/>
+          </a:stretch>
+        </p:blipFill>
+        <p:spPr>
+          <a:xfrm>
+            <a:off x="3468220" y="4030756"/>
+            <a:ext cx="4419600" cy="361950"/>
+          </a:xfrm>
+          <a:prstGeom prst="rect">
+            <a:avLst/>
+          </a:prstGeom>
+        </p:spPr>
+      </p:pic>
+      <p:pic>
+        <p:nvPicPr>
+          <p:cNvPr id="10" name="Immagine 9"/>
+          <p:cNvPicPr>
+            <a:picLocks noChangeAspect="1"/>
+          </p:cNvPicPr>
+          <p:nvPr/>
+        </p:nvPicPr>
+        <p:blipFill>
+          <a:blip r:embed="rId5">
+            <a:extLst>
+              <a:ext uri="{28A0092B-C50C-407E-A947-70E740481C1C}">
+                <a14:useLocalDpi xmlns:a14="http://schemas.microsoft.com/office/drawing/2010/main" val="0"/>
+              </a:ext>
+            </a:extLst>
+          </a:blip>
+          <a:stretch>
+            <a:fillRect/>
+          </a:stretch>
+        </p:blipFill>
+        <p:spPr>
+          <a:xfrm>
+            <a:off x="3468220" y="4392706"/>
+            <a:ext cx="7277100" cy="1038225"/>
           </a:xfrm>
           <a:prstGeom prst="rect">
             <a:avLst/>

</xml_diff>